<commit_message>
changed the KIT Logo to a .png version
</commit_message>
<xml_diff>
--- a/myMD_Planungsphase.pptx
+++ b/myMD_Planungsphase.pptx
@@ -720,69 +720,6 @@
           </a:p>
         </p:txBody>
       </p:sp>
-      <p:graphicFrame>
-        <p:nvGraphicFramePr>
-          <p:cNvPr id="7" name="Objekt 6">
-            <a:extLst>
-              <a:ext uri="{FF2B5EF4-FFF2-40B4-BE49-F238E27FC236}">
-                <a16:creationId xmlns:a16="http://schemas.microsoft.com/office/drawing/2014/main" id="{933507BC-F992-40D2-82A1-55E539E1714E}"/>
-              </a:ext>
-            </a:extLst>
-          </p:cNvPr>
-          <p:cNvGraphicFramePr>
-            <a:graphicFrameLocks noChangeAspect="1"/>
-          </p:cNvGraphicFramePr>
-          <p:nvPr userDrawn="1">
-            <p:extLst>
-              <p:ext uri="{D42A27DB-BD31-4B8C-83A1-F6EECF244321}">
-                <p14:modId xmlns:p14="http://schemas.microsoft.com/office/powerpoint/2010/main" val="759709651"/>
-              </p:ext>
-            </p:extLst>
-          </p:nvPr>
-        </p:nvGraphicFramePr>
-        <p:xfrm>
-          <a:off x="342900" y="265113"/>
-          <a:ext cx="1866900" cy="857250"/>
-        </p:xfrm>
-        <a:graphic>
-          <a:graphicData uri="http://schemas.openxmlformats.org/presentationml/2006/ole">
-            <mc:AlternateContent xmlns:mc="http://schemas.openxmlformats.org/markup-compatibility/2006">
-              <mc:Choice xmlns:v="urn:schemas-microsoft-com:vml" Requires="v">
-                <p:oleObj spid="_x0000_s1043" name="Acrobat Document" r:id="rId3" imgW="1866722" imgH="857250" progId="AcroExch.Document.DC">
-                  <p:embed/>
-                </p:oleObj>
-              </mc:Choice>
-              <mc:Fallback>
-                <p:oleObj name="Acrobat Document" r:id="rId3" imgW="1866722" imgH="857250" progId="AcroExch.Document.DC">
-                  <p:embed/>
-                  <p:pic>
-                    <p:nvPicPr>
-                      <p:cNvPr id="0" name=""/>
-                      <p:cNvPicPr/>
-                      <p:nvPr/>
-                    </p:nvPicPr>
-                    <p:blipFill>
-                      <a:blip r:embed="rId4"/>
-                      <a:stretch>
-                        <a:fillRect/>
-                      </a:stretch>
-                    </p:blipFill>
-                    <p:spPr>
-                      <a:xfrm>
-                        <a:off x="342900" y="265113"/>
-                        <a:ext cx="1866900" cy="857250"/>
-                      </a:xfrm>
-                      <a:prstGeom prst="rect">
-                        <a:avLst/>
-                      </a:prstGeom>
-                    </p:spPr>
-                  </p:pic>
-                </p:oleObj>
-              </mc:Fallback>
-            </mc:AlternateContent>
-          </a:graphicData>
-        </a:graphic>
-      </p:graphicFrame>
       <p:pic>
         <p:nvPicPr>
           <p:cNvPr id="9" name="Grafik 8" descr="Ein Bild, das Outdoorobjekt enthält.&#10;&#10;Mit hoher Zuverlässigkeit generierte Beschreibung">
@@ -798,7 +735,7 @@
           <p:nvPr userDrawn="1"/>
         </p:nvPicPr>
         <p:blipFill>
-          <a:blip r:embed="rId5">
+          <a:blip r:embed="rId2">
             <a:extLst>
               <a:ext uri="{28A0092B-C50C-407E-A947-70E740481C1C}">
                 <a14:useLocalDpi xmlns:a14="http://schemas.microsoft.com/office/drawing/2010/main" val="0"/>
@@ -819,6 +756,53 @@
           </a:prstGeom>
         </p:spPr>
       </p:pic>
+      <p:pic>
+        <p:nvPicPr>
+          <p:cNvPr id="1046" name="Picture 22" descr="http://www.tkm.uni-karlsruhe.de/~shnirman/kit_logo.png">
+            <a:extLst>
+              <a:ext uri="{FF2B5EF4-FFF2-40B4-BE49-F238E27FC236}">
+                <a16:creationId xmlns:a16="http://schemas.microsoft.com/office/drawing/2014/main" id="{B98AECDC-154B-4972-B535-81AD47CC696C}"/>
+              </a:ext>
+            </a:extLst>
+          </p:cNvPr>
+          <p:cNvPicPr>
+            <a:picLocks noChangeAspect="1" noChangeArrowheads="1"/>
+          </p:cNvPicPr>
+          <p:nvPr userDrawn="1"/>
+        </p:nvPicPr>
+        <p:blipFill>
+          <a:blip r:embed="rId3">
+            <a:extLst>
+              <a:ext uri="{28A0092B-C50C-407E-A947-70E740481C1C}">
+                <a14:useLocalDpi xmlns:a14="http://schemas.microsoft.com/office/drawing/2010/main" val="0"/>
+              </a:ext>
+            </a:extLst>
+          </a:blip>
+          <a:srcRect/>
+          <a:stretch>
+            <a:fillRect/>
+          </a:stretch>
+        </p:blipFill>
+        <p:spPr bwMode="auto">
+          <a:xfrm>
+            <a:off x="86497" y="264319"/>
+            <a:ext cx="1971678" cy="985839"/>
+          </a:xfrm>
+          <a:prstGeom prst="rect">
+            <a:avLst/>
+          </a:prstGeom>
+          <a:noFill/>
+          <a:extLst>
+            <a:ext uri="{909E8E84-426E-40DD-AFC4-6F175D3DCCD1}">
+              <a14:hiddenFill xmlns:a14="http://schemas.microsoft.com/office/drawing/2010/main">
+                <a:solidFill>
+                  <a:srgbClr val="FFFFFF"/>
+                </a:solidFill>
+              </a14:hiddenFill>
+            </a:ext>
+          </a:extLst>
+        </p:spPr>
+      </p:pic>
     </p:spTree>
     <p:extLst>
       <p:ext uri="{BB962C8B-B14F-4D97-AF65-F5344CB8AC3E}">
@@ -829,13 +813,13 @@
   <p:clrMapOvr>
     <a:masterClrMapping/>
   </p:clrMapOvr>
-  <mc:AlternateContent xmlns:mc="http://schemas.openxmlformats.org/markup-compatibility/2006">
-    <mc:Choice xmlns:p14="http://schemas.microsoft.com/office/powerpoint/2010/main" Requires="p14">
+  <mc:AlternateContent xmlns:mc="http://schemas.openxmlformats.org/markup-compatibility/2006" xmlns:p14="http://schemas.microsoft.com/office/powerpoint/2010/main">
+    <mc:Choice Requires="p14">
       <p:transition spd="med" p14:dur="700">
         <p:fade/>
       </p:transition>
     </mc:Choice>
-    <mc:Fallback>
+    <mc:Fallback xmlns="">
       <p:transition spd="med">
         <p:fade/>
       </p:transition>
@@ -1041,13 +1025,13 @@
   <p:clrMapOvr>
     <a:masterClrMapping/>
   </p:clrMapOvr>
-  <mc:AlternateContent xmlns:mc="http://schemas.openxmlformats.org/markup-compatibility/2006">
-    <mc:Choice xmlns:p14="http://schemas.microsoft.com/office/powerpoint/2010/main" Requires="p14">
+  <mc:AlternateContent xmlns:mc="http://schemas.openxmlformats.org/markup-compatibility/2006" xmlns:p14="http://schemas.microsoft.com/office/powerpoint/2010/main">
+    <mc:Choice Requires="p14">
       <p:transition spd="med" p14:dur="700">
         <p:fade/>
       </p:transition>
     </mc:Choice>
-    <mc:Fallback>
+    <mc:Fallback xmlns="">
       <p:transition spd="med">
         <p:fade/>
       </p:transition>
@@ -1263,13 +1247,13 @@
   <p:clrMapOvr>
     <a:masterClrMapping/>
   </p:clrMapOvr>
-  <mc:AlternateContent xmlns:mc="http://schemas.openxmlformats.org/markup-compatibility/2006">
-    <mc:Choice xmlns:p14="http://schemas.microsoft.com/office/powerpoint/2010/main" Requires="p14">
+  <mc:AlternateContent xmlns:mc="http://schemas.openxmlformats.org/markup-compatibility/2006" xmlns:p14="http://schemas.microsoft.com/office/powerpoint/2010/main">
+    <mc:Choice Requires="p14">
       <p:transition spd="med" p14:dur="700">
         <p:fade/>
       </p:transition>
     </mc:Choice>
-    <mc:Fallback>
+    <mc:Fallback xmlns="">
       <p:transition spd="med">
         <p:fade/>
       </p:transition>
@@ -1510,75 +1494,6 @@
           </a:p>
         </p:txBody>
       </p:sp>
-      <p:graphicFrame>
-        <p:nvGraphicFramePr>
-          <p:cNvPr id="7" name="Objekt 6">
-            <a:extLst>
-              <a:ext uri="{FF2B5EF4-FFF2-40B4-BE49-F238E27FC236}">
-                <a16:creationId xmlns:a16="http://schemas.microsoft.com/office/drawing/2014/main" id="{CA5D8834-0F95-4A4A-B5FA-80B39A55F10B}"/>
-              </a:ext>
-            </a:extLst>
-          </p:cNvPr>
-          <p:cNvGraphicFramePr>
-            <a:graphicFrameLocks noChangeAspect="1"/>
-          </p:cNvGraphicFramePr>
-          <p:nvPr userDrawn="1">
-            <p:extLst>
-              <p:ext uri="{D42A27DB-BD31-4B8C-83A1-F6EECF244321}">
-                <p14:modId xmlns:p14="http://schemas.microsoft.com/office/powerpoint/2010/main" val="1449257245"/>
-              </p:ext>
-            </p:extLst>
-          </p:nvPr>
-        </p:nvGraphicFramePr>
-        <p:xfrm>
-          <a:off x="342900" y="265113"/>
-          <a:ext cx="1866900" cy="857250"/>
-        </p:xfrm>
-        <a:graphic>
-          <a:graphicData uri="http://schemas.openxmlformats.org/presentationml/2006/ole">
-            <mc:AlternateContent xmlns:mc="http://schemas.openxmlformats.org/markup-compatibility/2006">
-              <mc:Choice xmlns:v="urn:schemas-microsoft-com:vml" Requires="v">
-                <p:oleObj spid="_x0000_s2062" name="Acrobat Document" r:id="rId3" imgW="1866722" imgH="857250" progId="AcroExch.Document.DC">
-                  <p:embed/>
-                </p:oleObj>
-              </mc:Choice>
-              <mc:Fallback>
-                <p:oleObj name="Acrobat Document" r:id="rId3" imgW="1866722" imgH="857250" progId="AcroExch.Document.DC">
-                  <p:embed/>
-                  <p:pic>
-                    <p:nvPicPr>
-                      <p:cNvPr id="7" name="Objekt 6">
-                        <a:extLst>
-                          <a:ext uri="{FF2B5EF4-FFF2-40B4-BE49-F238E27FC236}">
-                            <a16:creationId xmlns:a16="http://schemas.microsoft.com/office/drawing/2014/main" id="{933507BC-F992-40D2-82A1-55E539E1714E}"/>
-                          </a:ext>
-                        </a:extLst>
-                      </p:cNvPr>
-                      <p:cNvPicPr/>
-                      <p:nvPr/>
-                    </p:nvPicPr>
-                    <p:blipFill>
-                      <a:blip r:embed="rId4"/>
-                      <a:stretch>
-                        <a:fillRect/>
-                      </a:stretch>
-                    </p:blipFill>
-                    <p:spPr>
-                      <a:xfrm>
-                        <a:off x="342900" y="265113"/>
-                        <a:ext cx="1866900" cy="857250"/>
-                      </a:xfrm>
-                      <a:prstGeom prst="rect">
-                        <a:avLst/>
-                      </a:prstGeom>
-                    </p:spPr>
-                  </p:pic>
-                </p:oleObj>
-              </mc:Fallback>
-            </mc:AlternateContent>
-          </a:graphicData>
-        </a:graphic>
-      </p:graphicFrame>
       <p:pic>
         <p:nvPicPr>
           <p:cNvPr id="8" name="Grafik 7" descr="Ein Bild, das Outdoorobjekt enthält.&#10;&#10;Mit hoher Zuverlässigkeit generierte Beschreibung">
@@ -1594,7 +1509,7 @@
           <p:nvPr userDrawn="1"/>
         </p:nvPicPr>
         <p:blipFill>
-          <a:blip r:embed="rId5">
+          <a:blip r:embed="rId2">
             <a:extLst>
               <a:ext uri="{28A0092B-C50C-407E-A947-70E740481C1C}">
                 <a14:useLocalDpi xmlns:a14="http://schemas.microsoft.com/office/drawing/2010/main" val="0"/>
@@ -1615,6 +1530,53 @@
           </a:prstGeom>
         </p:spPr>
       </p:pic>
+      <p:pic>
+        <p:nvPicPr>
+          <p:cNvPr id="9" name="Picture 22" descr="http://www.tkm.uni-karlsruhe.de/~shnirman/kit_logo.png">
+            <a:extLst>
+              <a:ext uri="{FF2B5EF4-FFF2-40B4-BE49-F238E27FC236}">
+                <a16:creationId xmlns:a16="http://schemas.microsoft.com/office/drawing/2014/main" id="{02F42198-A48C-4686-A2C4-8DE5826CE84B}"/>
+              </a:ext>
+            </a:extLst>
+          </p:cNvPr>
+          <p:cNvPicPr>
+            <a:picLocks noChangeAspect="1" noChangeArrowheads="1"/>
+          </p:cNvPicPr>
+          <p:nvPr userDrawn="1"/>
+        </p:nvPicPr>
+        <p:blipFill>
+          <a:blip r:embed="rId3">
+            <a:extLst>
+              <a:ext uri="{28A0092B-C50C-407E-A947-70E740481C1C}">
+                <a14:useLocalDpi xmlns:a14="http://schemas.microsoft.com/office/drawing/2010/main" val="0"/>
+              </a:ext>
+            </a:extLst>
+          </a:blip>
+          <a:srcRect/>
+          <a:stretch>
+            <a:fillRect/>
+          </a:stretch>
+        </p:blipFill>
+        <p:spPr bwMode="auto">
+          <a:xfrm>
+            <a:off x="144162" y="265114"/>
+            <a:ext cx="1971678" cy="985839"/>
+          </a:xfrm>
+          <a:prstGeom prst="rect">
+            <a:avLst/>
+          </a:prstGeom>
+          <a:noFill/>
+          <a:extLst>
+            <a:ext uri="{909E8E84-426E-40DD-AFC4-6F175D3DCCD1}">
+              <a14:hiddenFill xmlns:a14="http://schemas.microsoft.com/office/drawing/2010/main">
+                <a:solidFill>
+                  <a:srgbClr val="FFFFFF"/>
+                </a:solidFill>
+              </a14:hiddenFill>
+            </a:ext>
+          </a:extLst>
+        </p:spPr>
+      </p:pic>
     </p:spTree>
     <p:extLst>
       <p:ext uri="{BB962C8B-B14F-4D97-AF65-F5344CB8AC3E}">
@@ -1625,13 +1587,13 @@
   <p:clrMapOvr>
     <a:masterClrMapping/>
   </p:clrMapOvr>
-  <mc:AlternateContent xmlns:mc="http://schemas.openxmlformats.org/markup-compatibility/2006">
-    <mc:Choice xmlns:p14="http://schemas.microsoft.com/office/powerpoint/2010/main" Requires="p14">
+  <mc:AlternateContent xmlns:mc="http://schemas.openxmlformats.org/markup-compatibility/2006" xmlns:p14="http://schemas.microsoft.com/office/powerpoint/2010/main">
+    <mc:Choice Requires="p14">
       <p:transition spd="med" p14:dur="700">
         <p:fade/>
       </p:transition>
     </mc:Choice>
-    <mc:Fallback>
+    <mc:Fallback xmlns="">
       <p:transition spd="med">
         <p:fade/>
       </p:transition>
@@ -1914,13 +1876,13 @@
   <p:clrMapOvr>
     <a:masterClrMapping/>
   </p:clrMapOvr>
-  <mc:AlternateContent xmlns:mc="http://schemas.openxmlformats.org/markup-compatibility/2006">
-    <mc:Choice xmlns:p14="http://schemas.microsoft.com/office/powerpoint/2010/main" Requires="p14">
+  <mc:AlternateContent xmlns:mc="http://schemas.openxmlformats.org/markup-compatibility/2006" xmlns:p14="http://schemas.microsoft.com/office/powerpoint/2010/main">
+    <mc:Choice Requires="p14">
       <p:transition spd="med" p14:dur="700">
         <p:fade/>
       </p:transition>
     </mc:Choice>
-    <mc:Fallback>
+    <mc:Fallback xmlns="">
       <p:transition spd="med">
         <p:fade/>
       </p:transition>
@@ -2193,13 +2155,13 @@
   <p:clrMapOvr>
     <a:masterClrMapping/>
   </p:clrMapOvr>
-  <mc:AlternateContent xmlns:mc="http://schemas.openxmlformats.org/markup-compatibility/2006">
-    <mc:Choice xmlns:p14="http://schemas.microsoft.com/office/powerpoint/2010/main" Requires="p14">
+  <mc:AlternateContent xmlns:mc="http://schemas.openxmlformats.org/markup-compatibility/2006" xmlns:p14="http://schemas.microsoft.com/office/powerpoint/2010/main">
+    <mc:Choice Requires="p14">
       <p:transition spd="med" p14:dur="700">
         <p:fade/>
       </p:transition>
     </mc:Choice>
-    <mc:Fallback>
+    <mc:Fallback xmlns="">
       <p:transition spd="med">
         <p:fade/>
       </p:transition>
@@ -2619,13 +2581,13 @@
   <p:clrMapOvr>
     <a:masterClrMapping/>
   </p:clrMapOvr>
-  <mc:AlternateContent xmlns:mc="http://schemas.openxmlformats.org/markup-compatibility/2006">
-    <mc:Choice xmlns:p14="http://schemas.microsoft.com/office/powerpoint/2010/main" Requires="p14">
+  <mc:AlternateContent xmlns:mc="http://schemas.openxmlformats.org/markup-compatibility/2006" xmlns:p14="http://schemas.microsoft.com/office/powerpoint/2010/main">
+    <mc:Choice Requires="p14">
       <p:transition spd="med" p14:dur="700">
         <p:fade/>
       </p:transition>
     </mc:Choice>
-    <mc:Fallback>
+    <mc:Fallback xmlns="">
       <p:transition spd="med">
         <p:fade/>
       </p:transition>
@@ -2774,13 +2736,13 @@
   <p:clrMapOvr>
     <a:masterClrMapping/>
   </p:clrMapOvr>
-  <mc:AlternateContent xmlns:mc="http://schemas.openxmlformats.org/markup-compatibility/2006">
-    <mc:Choice xmlns:p14="http://schemas.microsoft.com/office/powerpoint/2010/main" Requires="p14">
+  <mc:AlternateContent xmlns:mc="http://schemas.openxmlformats.org/markup-compatibility/2006" xmlns:p14="http://schemas.microsoft.com/office/powerpoint/2010/main">
+    <mc:Choice Requires="p14">
       <p:transition spd="med" p14:dur="700">
         <p:fade/>
       </p:transition>
     </mc:Choice>
-    <mc:Fallback>
+    <mc:Fallback xmlns="">
       <p:transition spd="med">
         <p:fade/>
       </p:transition>
@@ -2901,13 +2863,13 @@
   <p:clrMapOvr>
     <a:masterClrMapping/>
   </p:clrMapOvr>
-  <mc:AlternateContent xmlns:mc="http://schemas.openxmlformats.org/markup-compatibility/2006">
-    <mc:Choice xmlns:p14="http://schemas.microsoft.com/office/powerpoint/2010/main" Requires="p14">
+  <mc:AlternateContent xmlns:mc="http://schemas.openxmlformats.org/markup-compatibility/2006" xmlns:p14="http://schemas.microsoft.com/office/powerpoint/2010/main">
+    <mc:Choice Requires="p14">
       <p:transition spd="med" p14:dur="700">
         <p:fade/>
       </p:transition>
     </mc:Choice>
-    <mc:Fallback>
+    <mc:Fallback xmlns="">
       <p:transition spd="med">
         <p:fade/>
       </p:transition>
@@ -3226,13 +3188,13 @@
   <p:clrMapOvr>
     <a:masterClrMapping/>
   </p:clrMapOvr>
-  <mc:AlternateContent xmlns:mc="http://schemas.openxmlformats.org/markup-compatibility/2006">
-    <mc:Choice xmlns:p14="http://schemas.microsoft.com/office/powerpoint/2010/main" Requires="p14">
+  <mc:AlternateContent xmlns:mc="http://schemas.openxmlformats.org/markup-compatibility/2006" xmlns:p14="http://schemas.microsoft.com/office/powerpoint/2010/main">
+    <mc:Choice Requires="p14">
       <p:transition spd="med" p14:dur="700">
         <p:fade/>
       </p:transition>
     </mc:Choice>
-    <mc:Fallback>
+    <mc:Fallback xmlns="">
       <p:transition spd="med">
         <p:fade/>
       </p:transition>
@@ -3528,13 +3490,13 @@
   <p:clrMapOvr>
     <a:masterClrMapping/>
   </p:clrMapOvr>
-  <mc:AlternateContent xmlns:mc="http://schemas.openxmlformats.org/markup-compatibility/2006">
-    <mc:Choice xmlns:p14="http://schemas.microsoft.com/office/powerpoint/2010/main" Requires="p14">
+  <mc:AlternateContent xmlns:mc="http://schemas.openxmlformats.org/markup-compatibility/2006" xmlns:p14="http://schemas.microsoft.com/office/powerpoint/2010/main">
+    <mc:Choice Requires="p14">
       <p:transition spd="med" p14:dur="700">
         <p:fade/>
       </p:transition>
     </mc:Choice>
-    <mc:Fallback>
+    <mc:Fallback xmlns="">
       <p:transition spd="med">
         <p:fade/>
       </p:transition>
@@ -3830,13 +3792,13 @@
     <p:sldLayoutId id="2147483658" r:id="rId10"/>
     <p:sldLayoutId id="2147483659" r:id="rId11"/>
   </p:sldLayoutIdLst>
-  <mc:AlternateContent xmlns:mc="http://schemas.openxmlformats.org/markup-compatibility/2006">
-    <mc:Choice xmlns:p14="http://schemas.microsoft.com/office/powerpoint/2010/main" Requires="p14">
+  <mc:AlternateContent xmlns:mc="http://schemas.openxmlformats.org/markup-compatibility/2006" xmlns:p14="http://schemas.microsoft.com/office/powerpoint/2010/main">
+    <mc:Choice Requires="p14">
       <p:transition spd="med" p14:dur="700">
         <p:fade/>
       </p:transition>
     </mc:Choice>
-    <mc:Fallback>
+    <mc:Fallback xmlns="">
       <p:transition spd="med">
         <p:fade/>
       </p:transition>
@@ -4211,13 +4173,13 @@
   <p:clrMapOvr>
     <a:masterClrMapping/>
   </p:clrMapOvr>
-  <mc:AlternateContent xmlns:mc="http://schemas.openxmlformats.org/markup-compatibility/2006">
-    <mc:Choice xmlns:p14="http://schemas.microsoft.com/office/powerpoint/2010/main" Requires="p14">
+  <mc:AlternateContent xmlns:mc="http://schemas.openxmlformats.org/markup-compatibility/2006" xmlns:p14="http://schemas.microsoft.com/office/powerpoint/2010/main">
+    <mc:Choice Requires="p14">
       <p:transition spd="med" p14:dur="700">
         <p:fade/>
       </p:transition>
     </mc:Choice>
-    <mc:Fallback>
+    <mc:Fallback xmlns="">
       <p:transition spd="med">
         <p:fade/>
       </p:transition>
@@ -4426,13 +4388,13 @@
   <p:clrMapOvr>
     <a:masterClrMapping/>
   </p:clrMapOvr>
-  <mc:AlternateContent xmlns:mc="http://schemas.openxmlformats.org/markup-compatibility/2006">
-    <mc:Choice xmlns:p14="http://schemas.microsoft.com/office/powerpoint/2010/main" Requires="p14">
+  <mc:AlternateContent xmlns:mc="http://schemas.openxmlformats.org/markup-compatibility/2006" xmlns:p14="http://schemas.microsoft.com/office/powerpoint/2010/main">
+    <mc:Choice Requires="p14">
       <p:transition spd="med" p14:dur="700">
         <p:fade/>
       </p:transition>
     </mc:Choice>
-    <mc:Fallback>
+    <mc:Fallback xmlns="">
       <p:transition spd="med">
         <p:fade/>
       </p:transition>
@@ -4921,13 +4883,13 @@
   <p:clrMapOvr>
     <a:masterClrMapping/>
   </p:clrMapOvr>
-  <mc:AlternateContent xmlns:mc="http://schemas.openxmlformats.org/markup-compatibility/2006">
-    <mc:Choice xmlns:p14="http://schemas.microsoft.com/office/powerpoint/2010/main" Requires="p14">
+  <mc:AlternateContent xmlns:mc="http://schemas.openxmlformats.org/markup-compatibility/2006" xmlns:p14="http://schemas.microsoft.com/office/powerpoint/2010/main">
+    <mc:Choice Requires="p14">
       <p:transition spd="med" p14:dur="700">
         <p:fade/>
       </p:transition>
     </mc:Choice>
-    <mc:Fallback>
+    <mc:Fallback xmlns="">
       <p:transition spd="med">
         <p:fade/>
       </p:transition>
@@ -5397,13 +5359,13 @@
   <p:clrMapOvr>
     <a:masterClrMapping/>
   </p:clrMapOvr>
-  <mc:AlternateContent xmlns:mc="http://schemas.openxmlformats.org/markup-compatibility/2006">
-    <mc:Choice xmlns:p14="http://schemas.microsoft.com/office/powerpoint/2010/main" Requires="p14">
+  <mc:AlternateContent xmlns:mc="http://schemas.openxmlformats.org/markup-compatibility/2006" xmlns:p14="http://schemas.microsoft.com/office/powerpoint/2010/main">
+    <mc:Choice Requires="p14">
       <p:transition spd="med" p14:dur="700">
         <p:fade/>
       </p:transition>
     </mc:Choice>
-    <mc:Fallback>
+    <mc:Fallback xmlns="">
       <p:transition spd="med">
         <p:fade/>
       </p:transition>
@@ -5806,13 +5768,13 @@
   <p:clrMapOvr>
     <a:masterClrMapping/>
   </p:clrMapOvr>
-  <mc:AlternateContent xmlns:mc="http://schemas.openxmlformats.org/markup-compatibility/2006">
-    <mc:Choice xmlns:p14="http://schemas.microsoft.com/office/powerpoint/2010/main" Requires="p14">
+  <mc:AlternateContent xmlns:mc="http://schemas.openxmlformats.org/markup-compatibility/2006" xmlns:p14="http://schemas.microsoft.com/office/powerpoint/2010/main">
+    <mc:Choice Requires="p14">
       <p:transition spd="med" p14:dur="700">
         <p:fade/>
       </p:transition>
     </mc:Choice>
-    <mc:Fallback>
+    <mc:Fallback xmlns="">
       <p:transition spd="med">
         <p:fade/>
       </p:transition>
@@ -6025,13 +5987,13 @@
   <p:clrMapOvr>
     <a:masterClrMapping/>
   </p:clrMapOvr>
-  <mc:AlternateContent xmlns:mc="http://schemas.openxmlformats.org/markup-compatibility/2006">
-    <mc:Choice xmlns:p14="http://schemas.microsoft.com/office/powerpoint/2010/main" Requires="p14">
+  <mc:AlternateContent xmlns:mc="http://schemas.openxmlformats.org/markup-compatibility/2006" xmlns:p14="http://schemas.microsoft.com/office/powerpoint/2010/main">
+    <mc:Choice Requires="p14">
       <p:transition spd="med" p14:dur="700">
         <p:fade/>
       </p:transition>
     </mc:Choice>
-    <mc:Fallback>
+    <mc:Fallback xmlns="">
       <p:transition spd="med">
         <p:fade/>
       </p:transition>
@@ -6418,13 +6380,13 @@
   <p:clrMapOvr>
     <a:masterClrMapping/>
   </p:clrMapOvr>
-  <mc:AlternateContent xmlns:mc="http://schemas.openxmlformats.org/markup-compatibility/2006">
-    <mc:Choice xmlns:p14="http://schemas.microsoft.com/office/powerpoint/2010/main" Requires="p14">
+  <mc:AlternateContent xmlns:mc="http://schemas.openxmlformats.org/markup-compatibility/2006" xmlns:p14="http://schemas.microsoft.com/office/powerpoint/2010/main">
+    <mc:Choice Requires="p14">
       <p:transition spd="med" p14:dur="700">
         <p:fade/>
       </p:transition>
     </mc:Choice>
-    <mc:Fallback>
+    <mc:Fallback xmlns="">
       <p:transition spd="med">
         <p:fade/>
       </p:transition>
@@ -6937,13 +6899,13 @@
   <p:clrMapOvr>
     <a:masterClrMapping/>
   </p:clrMapOvr>
-  <mc:AlternateContent xmlns:mc="http://schemas.openxmlformats.org/markup-compatibility/2006">
-    <mc:Choice xmlns:p14="http://schemas.microsoft.com/office/powerpoint/2010/main" Requires="p14">
+  <mc:AlternateContent xmlns:mc="http://schemas.openxmlformats.org/markup-compatibility/2006" xmlns:p14="http://schemas.microsoft.com/office/powerpoint/2010/main">
+    <mc:Choice Requires="p14">
       <p:transition spd="med" p14:dur="700">
         <p:fade/>
       </p:transition>
     </mc:Choice>
-    <mc:Fallback>
+    <mc:Fallback xmlns="">
       <p:transition spd="med">
         <p:fade/>
       </p:transition>
@@ -7290,13 +7252,13 @@
   <p:clrMapOvr>
     <a:masterClrMapping/>
   </p:clrMapOvr>
-  <mc:AlternateContent xmlns:mc="http://schemas.openxmlformats.org/markup-compatibility/2006">
-    <mc:Choice xmlns:p14="http://schemas.microsoft.com/office/powerpoint/2010/main" Requires="p14">
+  <mc:AlternateContent xmlns:mc="http://schemas.openxmlformats.org/markup-compatibility/2006" xmlns:p14="http://schemas.microsoft.com/office/powerpoint/2010/main">
+    <mc:Choice Requires="p14">
       <p:transition spd="med" p14:dur="700">
         <p:fade/>
       </p:transition>
     </mc:Choice>
-    <mc:Fallback>
+    <mc:Fallback xmlns="">
       <p:transition spd="med">
         <p:fade/>
       </p:transition>
@@ -7743,13 +7705,13 @@
   <p:clrMapOvr>
     <a:masterClrMapping/>
   </p:clrMapOvr>
-  <mc:AlternateContent xmlns:mc="http://schemas.openxmlformats.org/markup-compatibility/2006">
-    <mc:Choice xmlns:p14="http://schemas.microsoft.com/office/powerpoint/2010/main" Requires="p14">
+  <mc:AlternateContent xmlns:mc="http://schemas.openxmlformats.org/markup-compatibility/2006" xmlns:p14="http://schemas.microsoft.com/office/powerpoint/2010/main">
+    <mc:Choice Requires="p14">
       <p:transition spd="med" p14:dur="700">
         <p:fade/>
       </p:transition>
     </mc:Choice>
-    <mc:Fallback>
+    <mc:Fallback xmlns="">
       <p:transition spd="med">
         <p:fade/>
       </p:transition>
@@ -7959,13 +7921,13 @@
   <p:clrMapOvr>
     <a:masterClrMapping/>
   </p:clrMapOvr>
-  <mc:AlternateContent xmlns:mc="http://schemas.openxmlformats.org/markup-compatibility/2006">
-    <mc:Choice xmlns:p14="http://schemas.microsoft.com/office/powerpoint/2010/main" Requires="p14">
+  <mc:AlternateContent xmlns:mc="http://schemas.openxmlformats.org/markup-compatibility/2006" xmlns:p14="http://schemas.microsoft.com/office/powerpoint/2010/main">
+    <mc:Choice Requires="p14">
       <p:transition spd="med" p14:dur="700">
         <p:fade/>
       </p:transition>
     </mc:Choice>
-    <mc:Fallback>
+    <mc:Fallback xmlns="">
       <p:transition spd="med">
         <p:fade/>
       </p:transition>
@@ -8291,7 +8253,7 @@
           <a:p>
             <a:r>
               <a:rPr lang="de-DE" dirty="0"/>
-              <a:t>Eigene Krankenakte digital zu verwalten</a:t>
+              <a:t>Eigene Krankenakte digital verwalten</a:t>
             </a:r>
           </a:p>
         </p:txBody>
@@ -8306,13 +8268,13 @@
   <p:clrMapOvr>
     <a:masterClrMapping/>
   </p:clrMapOvr>
-  <mc:AlternateContent xmlns:mc="http://schemas.openxmlformats.org/markup-compatibility/2006">
-    <mc:Choice xmlns:p14="http://schemas.microsoft.com/office/powerpoint/2010/main" Requires="p14">
+  <mc:AlternateContent xmlns:mc="http://schemas.openxmlformats.org/markup-compatibility/2006" xmlns:p14="http://schemas.microsoft.com/office/powerpoint/2010/main">
+    <mc:Choice Requires="p14">
       <p:transition spd="med" p14:dur="700">
         <p:fade/>
       </p:transition>
     </mc:Choice>
-    <mc:Fallback>
+    <mc:Fallback xmlns="">
       <p:transition spd="med">
         <p:fade/>
       </p:transition>
@@ -8517,13 +8479,13 @@
   <p:clrMapOvr>
     <a:masterClrMapping/>
   </p:clrMapOvr>
-  <mc:AlternateContent xmlns:mc="http://schemas.openxmlformats.org/markup-compatibility/2006">
-    <mc:Choice xmlns:p14="http://schemas.microsoft.com/office/powerpoint/2010/main" Requires="p14">
+  <mc:AlternateContent xmlns:mc="http://schemas.openxmlformats.org/markup-compatibility/2006" xmlns:p14="http://schemas.microsoft.com/office/powerpoint/2010/main">
+    <mc:Choice Requires="p14">
       <p:transition spd="med" p14:dur="700">
         <p:fade/>
       </p:transition>
     </mc:Choice>
-    <mc:Fallback>
+    <mc:Fallback xmlns="">
       <p:transition spd="med">
         <p:fade/>
       </p:transition>
@@ -8915,13 +8877,13 @@
   <p:clrMapOvr>
     <a:masterClrMapping/>
   </p:clrMapOvr>
-  <mc:AlternateContent xmlns:mc="http://schemas.openxmlformats.org/markup-compatibility/2006">
-    <mc:Choice xmlns:p14="http://schemas.microsoft.com/office/powerpoint/2010/main" Requires="p14">
+  <mc:AlternateContent xmlns:mc="http://schemas.openxmlformats.org/markup-compatibility/2006" xmlns:p14="http://schemas.microsoft.com/office/powerpoint/2010/main">
+    <mc:Choice Requires="p14">
       <p:transition spd="med" p14:dur="700">
         <p:fade/>
       </p:transition>
     </mc:Choice>
-    <mc:Fallback>
+    <mc:Fallback xmlns="">
       <p:transition spd="med">
         <p:fade/>
       </p:transition>
@@ -9122,13 +9084,13 @@
   <p:clrMapOvr>
     <a:masterClrMapping/>
   </p:clrMapOvr>
-  <mc:AlternateContent xmlns:mc="http://schemas.openxmlformats.org/markup-compatibility/2006">
-    <mc:Choice xmlns:p14="http://schemas.microsoft.com/office/powerpoint/2010/main" Requires="p14">
+  <mc:AlternateContent xmlns:mc="http://schemas.openxmlformats.org/markup-compatibility/2006" xmlns:p14="http://schemas.microsoft.com/office/powerpoint/2010/main">
+    <mc:Choice Requires="p14">
       <p:transition spd="med" p14:dur="700">
         <p:fade/>
       </p:transition>
     </mc:Choice>
-    <mc:Fallback>
+    <mc:Fallback xmlns="">
       <p:transition spd="med">
         <p:fade/>
       </p:transition>
@@ -9551,13 +9513,13 @@
   <p:clrMapOvr>
     <a:masterClrMapping/>
   </p:clrMapOvr>
-  <mc:AlternateContent xmlns:mc="http://schemas.openxmlformats.org/markup-compatibility/2006">
-    <mc:Choice xmlns:p14="http://schemas.microsoft.com/office/powerpoint/2010/main" Requires="p14">
+  <mc:AlternateContent xmlns:mc="http://schemas.openxmlformats.org/markup-compatibility/2006" xmlns:p14="http://schemas.microsoft.com/office/powerpoint/2010/main">
+    <mc:Choice Requires="p14">
       <p:transition spd="med" p14:dur="700">
         <p:fade/>
       </p:transition>
     </mc:Choice>
-    <mc:Fallback>
+    <mc:Fallback xmlns="">
       <p:transition spd="med">
         <p:fade/>
       </p:transition>
@@ -9777,13 +9739,13 @@
   <p:clrMapOvr>
     <a:masterClrMapping/>
   </p:clrMapOvr>
-  <mc:AlternateContent xmlns:mc="http://schemas.openxmlformats.org/markup-compatibility/2006">
-    <mc:Choice xmlns:p14="http://schemas.microsoft.com/office/powerpoint/2010/main" Requires="p14">
+  <mc:AlternateContent xmlns:mc="http://schemas.openxmlformats.org/markup-compatibility/2006" xmlns:p14="http://schemas.microsoft.com/office/powerpoint/2010/main">
+    <mc:Choice Requires="p14">
       <p:transition spd="med" p14:dur="700">
         <p:fade/>
       </p:transition>
     </mc:Choice>
-    <mc:Fallback>
+    <mc:Fallback xmlns="">
       <p:transition spd="med">
         <p:fade/>
       </p:transition>
@@ -10003,13 +9965,13 @@
   <p:clrMapOvr>
     <a:masterClrMapping/>
   </p:clrMapOvr>
-  <mc:AlternateContent xmlns:mc="http://schemas.openxmlformats.org/markup-compatibility/2006">
-    <mc:Choice xmlns:p14="http://schemas.microsoft.com/office/powerpoint/2010/main" Requires="p14">
+  <mc:AlternateContent xmlns:mc="http://schemas.openxmlformats.org/markup-compatibility/2006" xmlns:p14="http://schemas.microsoft.com/office/powerpoint/2010/main">
+    <mc:Choice Requires="p14">
       <p:transition spd="med" p14:dur="700">
         <p:fade/>
       </p:transition>
     </mc:Choice>
-    <mc:Fallback>
+    <mc:Fallback xmlns="">
       <p:transition spd="med">
         <p:fade/>
       </p:transition>
@@ -10209,13 +10171,13 @@
   <p:clrMapOvr>
     <a:masterClrMapping/>
   </p:clrMapOvr>
-  <mc:AlternateContent xmlns:mc="http://schemas.openxmlformats.org/markup-compatibility/2006">
-    <mc:Choice xmlns:p14="http://schemas.microsoft.com/office/powerpoint/2010/main" Requires="p14">
+  <mc:AlternateContent xmlns:mc="http://schemas.openxmlformats.org/markup-compatibility/2006" xmlns:p14="http://schemas.microsoft.com/office/powerpoint/2010/main">
+    <mc:Choice Requires="p14">
       <p:transition spd="med" p14:dur="700">
         <p:fade/>
       </p:transition>
     </mc:Choice>
-    <mc:Fallback>
+    <mc:Fallback xmlns="">
       <p:transition spd="med">
         <p:fade/>
       </p:transition>
@@ -10428,13 +10390,13 @@
   <p:clrMapOvr>
     <a:masterClrMapping/>
   </p:clrMapOvr>
-  <mc:AlternateContent xmlns:mc="http://schemas.openxmlformats.org/markup-compatibility/2006">
-    <mc:Choice xmlns:p14="http://schemas.microsoft.com/office/powerpoint/2010/main" Requires="p14">
+  <mc:AlternateContent xmlns:mc="http://schemas.openxmlformats.org/markup-compatibility/2006" xmlns:p14="http://schemas.microsoft.com/office/powerpoint/2010/main">
+    <mc:Choice Requires="p14">
       <p:transition spd="med" p14:dur="700">
         <p:fade/>
       </p:transition>
     </mc:Choice>
-    <mc:Fallback>
+    <mc:Fallback xmlns="">
       <p:transition spd="med">
         <p:fade/>
       </p:transition>
@@ -10814,13 +10776,13 @@
   <p:clrMapOvr>
     <a:masterClrMapping/>
   </p:clrMapOvr>
-  <mc:AlternateContent xmlns:mc="http://schemas.openxmlformats.org/markup-compatibility/2006">
-    <mc:Choice xmlns:p14="http://schemas.microsoft.com/office/powerpoint/2010/main" Requires="p14">
+  <mc:AlternateContent xmlns:mc="http://schemas.openxmlformats.org/markup-compatibility/2006" xmlns:p14="http://schemas.microsoft.com/office/powerpoint/2010/main">
+    <mc:Choice Requires="p14">
       <p:transition spd="med" p14:dur="700">
         <p:fade/>
       </p:transition>
     </mc:Choice>
-    <mc:Fallback>
+    <mc:Fallback xmlns="">
       <p:transition spd="med">
         <p:fade/>
       </p:transition>
@@ -11162,13 +11124,13 @@
   <p:clrMapOvr>
     <a:masterClrMapping/>
   </p:clrMapOvr>
-  <mc:AlternateContent xmlns:mc="http://schemas.openxmlformats.org/markup-compatibility/2006">
-    <mc:Choice xmlns:p14="http://schemas.microsoft.com/office/powerpoint/2010/main" Requires="p14">
+  <mc:AlternateContent xmlns:mc="http://schemas.openxmlformats.org/markup-compatibility/2006" xmlns:p14="http://schemas.microsoft.com/office/powerpoint/2010/main">
+    <mc:Choice Requires="p14">
       <p:transition spd="med" p14:dur="700">
         <p:fade/>
       </p:transition>
     </mc:Choice>
-    <mc:Fallback>
+    <mc:Fallback xmlns="">
       <p:transition spd="med">
         <p:fade/>
       </p:transition>
@@ -11479,13 +11441,13 @@
   <p:clrMapOvr>
     <a:masterClrMapping/>
   </p:clrMapOvr>
-  <mc:AlternateContent xmlns:mc="http://schemas.openxmlformats.org/markup-compatibility/2006">
-    <mc:Choice xmlns:p14="http://schemas.microsoft.com/office/powerpoint/2010/main" Requires="p14">
+  <mc:AlternateContent xmlns:mc="http://schemas.openxmlformats.org/markup-compatibility/2006" xmlns:p14="http://schemas.microsoft.com/office/powerpoint/2010/main">
+    <mc:Choice Requires="p14">
       <p:transition spd="med" p14:dur="700">
         <p:fade/>
       </p:transition>
     </mc:Choice>
-    <mc:Fallback>
+    <mc:Fallback xmlns="">
       <p:transition spd="med">
         <p:fade/>
       </p:transition>
@@ -11810,13 +11772,13 @@
   <p:clrMapOvr>
     <a:masterClrMapping/>
   </p:clrMapOvr>
-  <mc:AlternateContent xmlns:mc="http://schemas.openxmlformats.org/markup-compatibility/2006">
-    <mc:Choice xmlns:p14="http://schemas.microsoft.com/office/powerpoint/2010/main" Requires="p14">
+  <mc:AlternateContent xmlns:mc="http://schemas.openxmlformats.org/markup-compatibility/2006" xmlns:p14="http://schemas.microsoft.com/office/powerpoint/2010/main">
+    <mc:Choice Requires="p14">
       <p:transition spd="med" p14:dur="700">
         <p:fade/>
       </p:transition>
     </mc:Choice>
-    <mc:Fallback>
+    <mc:Fallback xmlns="">
       <p:transition spd="med">
         <p:fade/>
       </p:transition>
@@ -12231,13 +12193,13 @@
   <p:clrMapOvr>
     <a:masterClrMapping/>
   </p:clrMapOvr>
-  <mc:AlternateContent xmlns:mc="http://schemas.openxmlformats.org/markup-compatibility/2006">
-    <mc:Choice xmlns:p14="http://schemas.microsoft.com/office/powerpoint/2010/main" Requires="p14">
+  <mc:AlternateContent xmlns:mc="http://schemas.openxmlformats.org/markup-compatibility/2006" xmlns:p14="http://schemas.microsoft.com/office/powerpoint/2010/main">
+    <mc:Choice Requires="p14">
       <p:transition spd="med" p14:dur="700">
         <p:fade/>
       </p:transition>
     </mc:Choice>
-    <mc:Fallback>
+    <mc:Fallback xmlns="">
       <p:transition spd="med">
         <p:fade/>
       </p:transition>
@@ -12628,13 +12590,13 @@
   <p:clrMapOvr>
     <a:masterClrMapping/>
   </p:clrMapOvr>
-  <mc:AlternateContent xmlns:mc="http://schemas.openxmlformats.org/markup-compatibility/2006">
-    <mc:Choice xmlns:p14="http://schemas.microsoft.com/office/powerpoint/2010/main" Requires="p14">
+  <mc:AlternateContent xmlns:mc="http://schemas.openxmlformats.org/markup-compatibility/2006" xmlns:p14="http://schemas.microsoft.com/office/powerpoint/2010/main">
+    <mc:Choice Requires="p14">
       <p:transition spd="med" p14:dur="700">
         <p:fade/>
       </p:transition>
     </mc:Choice>
-    <mc:Fallback>
+    <mc:Fallback xmlns="">
       <p:transition spd="med">
         <p:fade/>
       </p:transition>

</xml_diff>